<commit_message>
Final project artifacts added/created.
</commit_message>
<xml_diff>
--- a/Projects/Mod 1 Final Project/presentation.pptx
+++ b/Projects/Mod 1 Final Project/presentation.pptx
@@ -3111,7 +3111,7 @@
           <a:p>
             <a:fld id="{9866BB97-7527-472E-B458-4744210E0196}" type="datetimeFigureOut">
               <a:rPr lang="en-US" smtClean="0"/>
-              <a:t>5/10/2019</a:t>
+              <a:t>5/12/2019</a:t>
             </a:fld>
             <a:endParaRPr lang="en-US"/>
           </a:p>
@@ -3386,7 +3386,7 @@
           <a:p>
             <a:fld id="{9866BB97-7527-472E-B458-4744210E0196}" type="datetimeFigureOut">
               <a:rPr lang="en-US" smtClean="0"/>
-              <a:t>5/10/2019</a:t>
+              <a:t>5/12/2019</a:t>
             </a:fld>
             <a:endParaRPr lang="en-US"/>
           </a:p>
@@ -3580,7 +3580,7 @@
           <a:p>
             <a:fld id="{9866BB97-7527-472E-B458-4744210E0196}" type="datetimeFigureOut">
               <a:rPr lang="en-US" smtClean="0"/>
-              <a:t>5/10/2019</a:t>
+              <a:t>5/12/2019</a:t>
             </a:fld>
             <a:endParaRPr lang="en-US"/>
           </a:p>
@@ -3851,7 +3851,7 @@
           <a:p>
             <a:fld id="{9866BB97-7527-472E-B458-4744210E0196}" type="datetimeFigureOut">
               <a:rPr lang="en-US" smtClean="0"/>
-              <a:t>5/10/2019</a:t>
+              <a:t>5/12/2019</a:t>
             </a:fld>
             <a:endParaRPr lang="en-US"/>
           </a:p>
@@ -4178,7 +4178,7 @@
           <a:p>
             <a:fld id="{9866BB97-7527-472E-B458-4744210E0196}" type="datetimeFigureOut">
               <a:rPr lang="en-US" smtClean="0"/>
-              <a:t>5/10/2019</a:t>
+              <a:t>5/12/2019</a:t>
             </a:fld>
             <a:endParaRPr lang="en-US"/>
           </a:p>
@@ -4797,7 +4797,7 @@
           <a:p>
             <a:fld id="{9866BB97-7527-472E-B458-4744210E0196}" type="datetimeFigureOut">
               <a:rPr lang="en-US" smtClean="0"/>
-              <a:t>5/10/2019</a:t>
+              <a:t>5/12/2019</a:t>
             </a:fld>
             <a:endParaRPr lang="en-US"/>
           </a:p>
@@ -5644,7 +5644,7 @@
           <a:p>
             <a:fld id="{9866BB97-7527-472E-B458-4744210E0196}" type="datetimeFigureOut">
               <a:rPr lang="en-US" smtClean="0"/>
-              <a:t>5/10/2019</a:t>
+              <a:t>5/12/2019</a:t>
             </a:fld>
             <a:endParaRPr lang="en-US"/>
           </a:p>
@@ -5814,7 +5814,7 @@
           <a:p>
             <a:fld id="{9866BB97-7527-472E-B458-4744210E0196}" type="datetimeFigureOut">
               <a:rPr lang="en-US" smtClean="0"/>
-              <a:t>5/10/2019</a:t>
+              <a:t>5/12/2019</a:t>
             </a:fld>
             <a:endParaRPr lang="en-US"/>
           </a:p>
@@ -5994,7 +5994,7 @@
           <a:p>
             <a:fld id="{9866BB97-7527-472E-B458-4744210E0196}" type="datetimeFigureOut">
               <a:rPr lang="en-US" smtClean="0"/>
-              <a:t>5/10/2019</a:t>
+              <a:t>5/12/2019</a:t>
             </a:fld>
             <a:endParaRPr lang="en-US"/>
           </a:p>
@@ -6164,7 +6164,7 @@
           <a:p>
             <a:fld id="{9866BB97-7527-472E-B458-4744210E0196}" type="datetimeFigureOut">
               <a:rPr lang="en-US" smtClean="0"/>
-              <a:t>5/10/2019</a:t>
+              <a:t>5/12/2019</a:t>
             </a:fld>
             <a:endParaRPr lang="en-US"/>
           </a:p>
@@ -6411,7 +6411,7 @@
           <a:p>
             <a:fld id="{9866BB97-7527-472E-B458-4744210E0196}" type="datetimeFigureOut">
               <a:rPr lang="en-US" smtClean="0"/>
-              <a:t>5/10/2019</a:t>
+              <a:t>5/12/2019</a:t>
             </a:fld>
             <a:endParaRPr lang="en-US"/>
           </a:p>
@@ -6703,7 +6703,7 @@
           <a:p>
             <a:fld id="{9866BB97-7527-472E-B458-4744210E0196}" type="datetimeFigureOut">
               <a:rPr lang="en-US" smtClean="0"/>
-              <a:t>5/10/2019</a:t>
+              <a:t>5/12/2019</a:t>
             </a:fld>
             <a:endParaRPr lang="en-US"/>
           </a:p>
@@ -7147,7 +7147,7 @@
           <a:p>
             <a:fld id="{9866BB97-7527-472E-B458-4744210E0196}" type="datetimeFigureOut">
               <a:rPr lang="en-US" smtClean="0"/>
-              <a:t>5/10/2019</a:t>
+              <a:t>5/12/2019</a:t>
             </a:fld>
             <a:endParaRPr lang="en-US"/>
           </a:p>
@@ -7265,7 +7265,7 @@
           <a:p>
             <a:fld id="{9866BB97-7527-472E-B458-4744210E0196}" type="datetimeFigureOut">
               <a:rPr lang="en-US" smtClean="0"/>
-              <a:t>5/10/2019</a:t>
+              <a:t>5/12/2019</a:t>
             </a:fld>
             <a:endParaRPr lang="en-US"/>
           </a:p>
@@ -7360,7 +7360,7 @@
           <a:p>
             <a:fld id="{9866BB97-7527-472E-B458-4744210E0196}" type="datetimeFigureOut">
               <a:rPr lang="en-US" smtClean="0"/>
-              <a:t>5/10/2019</a:t>
+              <a:t>5/12/2019</a:t>
             </a:fld>
             <a:endParaRPr lang="en-US"/>
           </a:p>
@@ -7639,7 +7639,7 @@
           <a:p>
             <a:fld id="{9866BB97-7527-472E-B458-4744210E0196}" type="datetimeFigureOut">
               <a:rPr lang="en-US" smtClean="0"/>
-              <a:t>5/10/2019</a:t>
+              <a:t>5/12/2019</a:t>
             </a:fld>
             <a:endParaRPr lang="en-US"/>
           </a:p>
@@ -7914,7 +7914,7 @@
           <a:p>
             <a:fld id="{9866BB97-7527-472E-B458-4744210E0196}" type="datetimeFigureOut">
               <a:rPr lang="en-US" smtClean="0"/>
-              <a:t>5/10/2019</a:t>
+              <a:t>5/12/2019</a:t>
             </a:fld>
             <a:endParaRPr lang="en-US"/>
           </a:p>
@@ -8337,7 +8337,7 @@
           <a:p>
             <a:fld id="{9866BB97-7527-472E-B458-4744210E0196}" type="datetimeFigureOut">
               <a:rPr lang="en-US" smtClean="0"/>
-              <a:t>5/10/2019</a:t>
+              <a:t>5/12/2019</a:t>
             </a:fld>
             <a:endParaRPr lang="en-US"/>
           </a:p>
@@ -10971,7 +10971,15 @@
           <a:p>
             <a:r>
               <a:rPr lang="en-US" dirty="0"/>
-              <a:t>Predictive Model built for this data set is able to predict home prices with an 87% confidence rate.</a:t>
+              <a:t>Predictive Model built for this data set is able to predict home prices with </a:t>
+            </a:r>
+            <a:r>
+              <a:rPr lang="en-US"/>
+              <a:t>an 85% </a:t>
+            </a:r>
+            <a:r>
+              <a:rPr lang="en-US" dirty="0"/>
+              <a:t>confidence rate.</a:t>
             </a:r>
           </a:p>
           <a:p>
@@ -14853,53 +14861,6 @@
           </a:ln>
         </p:spPr>
       </p:sp>
-      <p:pic>
-        <p:nvPicPr>
-          <p:cNvPr id="1032" name="Picture 8">
-            <a:extLst>
-              <a:ext uri="{FF2B5EF4-FFF2-40B4-BE49-F238E27FC236}">
-                <a16:creationId xmlns:a16="http://schemas.microsoft.com/office/drawing/2014/main" id="{3C838F74-1116-4A74-9024-90919B303BCD}"/>
-              </a:ext>
-            </a:extLst>
-          </p:cNvPr>
-          <p:cNvPicPr>
-            <a:picLocks noChangeAspect="1" noChangeArrowheads="1"/>
-          </p:cNvPicPr>
-          <p:nvPr/>
-        </p:nvPicPr>
-        <p:blipFill>
-          <a:blip r:embed="rId3">
-            <a:extLst>
-              <a:ext uri="{28A0092B-C50C-407E-A947-70E740481C1C}">
-                <a14:useLocalDpi xmlns:a14="http://schemas.microsoft.com/office/drawing/2010/main" val="0"/>
-              </a:ext>
-            </a:extLst>
-          </a:blip>
-          <a:stretch>
-            <a:fillRect/>
-          </a:stretch>
-        </p:blipFill>
-        <p:spPr bwMode="auto">
-          <a:xfrm>
-            <a:off x="6053072" y="1598502"/>
-            <a:ext cx="5449889" cy="3660994"/>
-          </a:xfrm>
-          <a:prstGeom prst="rect">
-            <a:avLst/>
-          </a:prstGeom>
-          <a:noFill/>
-          <a:effectLst/>
-          <a:extLst>
-            <a:ext uri="{909E8E84-426E-40DD-AFC4-6F175D3DCCD1}">
-              <a14:hiddenFill xmlns:a14="http://schemas.microsoft.com/office/drawing/2010/main">
-                <a:solidFill>
-                  <a:srgbClr val="FFFFFF"/>
-                </a:solidFill>
-              </a14:hiddenFill>
-            </a:ext>
-          </a:extLst>
-        </p:spPr>
-      </p:pic>
       <p:sp>
         <p:nvSpPr>
           <p:cNvPr id="147" name="Rectangle 146">
@@ -14953,6 +14914,53 @@
           </a:fontRef>
         </p:style>
       </p:sp>
+      <p:pic>
+        <p:nvPicPr>
+          <p:cNvPr id="1026" name="Picture 2">
+            <a:extLst>
+              <a:ext uri="{FF2B5EF4-FFF2-40B4-BE49-F238E27FC236}">
+                <a16:creationId xmlns:a16="http://schemas.microsoft.com/office/drawing/2014/main" id="{DDEDA3D4-8F47-46B4-B45E-8C75B2FD616A}"/>
+              </a:ext>
+            </a:extLst>
+          </p:cNvPr>
+          <p:cNvPicPr>
+            <a:picLocks noChangeAspect="1" noChangeArrowheads="1"/>
+          </p:cNvPicPr>
+          <p:nvPr/>
+        </p:nvPicPr>
+        <p:blipFill>
+          <a:blip r:embed="rId3">
+            <a:extLst>
+              <a:ext uri="{28A0092B-C50C-407E-A947-70E740481C1C}">
+                <a14:useLocalDpi xmlns:a14="http://schemas.microsoft.com/office/drawing/2010/main" val="0"/>
+              </a:ext>
+            </a:extLst>
+          </a:blip>
+          <a:srcRect/>
+          <a:stretch>
+            <a:fillRect/>
+          </a:stretch>
+        </p:blipFill>
+        <p:spPr bwMode="auto">
+          <a:xfrm>
+            <a:off x="6551935" y="1901678"/>
+            <a:ext cx="4547251" cy="3054642"/>
+          </a:xfrm>
+          <a:prstGeom prst="rect">
+            <a:avLst/>
+          </a:prstGeom>
+          <a:noFill/>
+          <a:extLst>
+            <a:ext uri="{909E8E84-426E-40DD-AFC4-6F175D3DCCD1}">
+              <a14:hiddenFill xmlns:a14="http://schemas.microsoft.com/office/drawing/2010/main">
+                <a:solidFill>
+                  <a:srgbClr val="FFFFFF"/>
+                </a:solidFill>
+              </a14:hiddenFill>
+            </a:ext>
+          </a:extLst>
+        </p:spPr>
+      </p:pic>
     </p:spTree>
     <p:extLst>
       <p:ext uri="{BB962C8B-B14F-4D97-AF65-F5344CB8AC3E}">

</xml_diff>